<commit_message>
Calendar updates for Dubuque
</commit_message>
<xml_diff>
--- a/2013/KDahlby.201302.SoftwareCraftsmanshipCalendar.pptx
+++ b/2013/KDahlby.201302.SoftwareCraftsmanshipCalendar.pptx
@@ -12,26 +12,26 @@
     <p:sldId id="430" r:id="rId3"/>
     <p:sldId id="416" r:id="rId4"/>
     <p:sldId id="431" r:id="rId5"/>
-    <p:sldId id="432" r:id="rId6"/>
-    <p:sldId id="433" r:id="rId7"/>
-    <p:sldId id="434" r:id="rId8"/>
-    <p:sldId id="435" r:id="rId9"/>
-    <p:sldId id="436" r:id="rId10"/>
-    <p:sldId id="437" r:id="rId11"/>
+    <p:sldId id="467" r:id="rId6"/>
+    <p:sldId id="468" r:id="rId7"/>
+    <p:sldId id="469" r:id="rId8"/>
+    <p:sldId id="470" r:id="rId9"/>
+    <p:sldId id="471" r:id="rId10"/>
+    <p:sldId id="472" r:id="rId11"/>
     <p:sldId id="443" r:id="rId12"/>
     <p:sldId id="444" r:id="rId13"/>
     <p:sldId id="445" r:id="rId14"/>
     <p:sldId id="446" r:id="rId15"/>
     <p:sldId id="447" r:id="rId16"/>
     <p:sldId id="448" r:id="rId17"/>
-    <p:sldId id="438" r:id="rId18"/>
-    <p:sldId id="439" r:id="rId19"/>
-    <p:sldId id="440" r:id="rId20"/>
-    <p:sldId id="441" r:id="rId21"/>
-    <p:sldId id="442" r:id="rId22"/>
+    <p:sldId id="473" r:id="rId18"/>
+    <p:sldId id="474" r:id="rId19"/>
+    <p:sldId id="475" r:id="rId20"/>
+    <p:sldId id="476" r:id="rId21"/>
+    <p:sldId id="477" r:id="rId22"/>
     <p:sldId id="449" r:id="rId23"/>
   </p:sldIdLst>
-  <p:sldSz cx="9144000" cy="6858000" type="screen4x3"/>
+  <p:sldSz cx="9144000" cy="5715000" type="screen16x10"/>
   <p:notesSz cx="6858000" cy="9144000"/>
   <p:defaultTextStyle>
     <a:defPPr>
@@ -268,7 +268,7 @@
               <a:pPr>
                 <a:defRPr/>
               </a:pPr>
-              <a:t>2/4/2013</a:t>
+              <a:t>2/5/2013</a:t>
             </a:fld>
             <a:endParaRPr lang="en-US" dirty="0"/>
           </a:p>
@@ -286,8 +286,8 @@
         </p:nvSpPr>
         <p:spPr>
           <a:xfrm>
-            <a:off x="1143000" y="685800"/>
-            <a:ext cx="4572000" cy="3429000"/>
+            <a:off x="685800" y="685800"/>
+            <a:ext cx="5486400" cy="3429000"/>
           </a:xfrm>
           <a:prstGeom prst="rect">
             <a:avLst/>
@@ -622,6 +622,10 @@
           </p:nvPr>
         </p:nvSpPr>
         <p:spPr bwMode="auto">
+          <a:xfrm>
+            <a:off x="685800" y="685800"/>
+            <a:ext cx="5486400" cy="3429000"/>
+          </a:xfrm>
           <a:noFill/>
           <a:ln>
             <a:solidFill>
@@ -752,8 +756,8 @@
         </p:nvSpPr>
         <p:spPr bwMode="ltGray">
           <a:xfrm>
-            <a:off x="0" y="0"/>
-            <a:ext cx="9143999" cy="5135430"/>
+            <a:off x="1" y="0"/>
+            <a:ext cx="9143999" cy="4279525"/>
           </a:xfrm>
           <a:prstGeom prst="rect">
             <a:avLst/>
@@ -803,8 +807,8 @@
         </p:nvSpPr>
         <p:spPr>
           <a:xfrm>
-            <a:off x="685800" y="3355848"/>
-            <a:ext cx="8077200" cy="1673352"/>
+            <a:off x="685800" y="2796540"/>
+            <a:ext cx="8077200" cy="1394460"/>
           </a:xfrm>
         </p:spPr>
         <p:txBody>
@@ -847,8 +851,8 @@
         </p:nvSpPr>
         <p:spPr>
           <a:xfrm>
-            <a:off x="685800" y="1828800"/>
-            <a:ext cx="8077200" cy="1499616"/>
+            <a:off x="685800" y="1524000"/>
+            <a:ext cx="8077200" cy="1249680"/>
           </a:xfrm>
         </p:spPr>
         <p:txBody>
@@ -976,7 +980,7 @@
               <a:pPr>
                 <a:defRPr/>
               </a:pPr>
-              <a:t>2/4/2013</a:t>
+              <a:t>2/5/2013</a:t>
             </a:fld>
             <a:endParaRPr lang="en-US"/>
           </a:p>
@@ -1041,8 +1045,8 @@
         </p:nvSpPr>
         <p:spPr bwMode="invGray">
           <a:xfrm>
-            <a:off x="0" y="5128334"/>
-            <a:ext cx="9144000" cy="45720"/>
+            <a:off x="0" y="4273612"/>
+            <a:ext cx="9144000" cy="38100"/>
           </a:xfrm>
           <a:prstGeom prst="rect">
             <a:avLst/>
@@ -1224,7 +1228,7 @@
               <a:pPr>
                 <a:defRPr/>
               </a:pPr>
-              <a:t>2/4/2013</a:t>
+              <a:t>2/5/2013</a:t>
             </a:fld>
             <a:endParaRPr lang="en-US" dirty="0"/>
           </a:p>
@@ -1325,7 +1329,7 @@
         <p:spPr bwMode="invGray">
           <a:xfrm>
             <a:off x="6598920" y="0"/>
-            <a:ext cx="45720" cy="6858000"/>
+            <a:ext cx="45720" cy="5715000"/>
           </a:xfrm>
           <a:prstGeom prst="rect">
             <a:avLst/>
@@ -1378,8 +1382,8 @@
         </p:nvSpPr>
         <p:spPr bwMode="ltGray">
           <a:xfrm>
-            <a:off x="6647687" y="0"/>
-            <a:ext cx="2514601" cy="6858000"/>
+            <a:off x="6647688" y="0"/>
+            <a:ext cx="2514601" cy="5715000"/>
           </a:xfrm>
           <a:prstGeom prst="rect">
             <a:avLst/>
@@ -1429,8 +1433,8 @@
         </p:nvSpPr>
         <p:spPr>
           <a:xfrm>
-            <a:off x="6781800" y="274640"/>
-            <a:ext cx="1905000" cy="5851525"/>
+            <a:off x="6781800" y="228867"/>
+            <a:ext cx="1905000" cy="4876271"/>
           </a:xfrm>
         </p:spPr>
         <p:txBody>
@@ -1459,8 +1463,8 @@
         </p:nvSpPr>
         <p:spPr>
           <a:xfrm>
-            <a:off x="457200" y="304800"/>
-            <a:ext cx="6019800" cy="5851525"/>
+            <a:off x="457200" y="254000"/>
+            <a:ext cx="6019800" cy="4876271"/>
           </a:xfrm>
         </p:spPr>
         <p:txBody>
@@ -1529,7 +1533,7 @@
               <a:pPr>
                 <a:defRPr/>
               </a:pPr>
-              <a:t>2/4/2013</a:t>
+              <a:t>2/5/2013</a:t>
             </a:fld>
             <a:endParaRPr lang="en-US" dirty="0"/>
           </a:p>
@@ -1547,8 +1551,8 @@
         </p:nvSpPr>
         <p:spPr>
           <a:xfrm>
-            <a:off x="2640597" y="6377459"/>
-            <a:ext cx="3836404" cy="365125"/>
+            <a:off x="2640597" y="5314550"/>
+            <a:ext cx="3836404" cy="304271"/>
           </a:xfrm>
         </p:spPr>
         <p:txBody>
@@ -1638,8 +1642,8 @@
         </p:nvSpPr>
         <p:spPr>
           <a:xfrm>
-            <a:off x="457200" y="155448"/>
-            <a:ext cx="8229600" cy="1252728"/>
+            <a:off x="457200" y="129540"/>
+            <a:ext cx="8229600" cy="1043940"/>
           </a:xfrm>
         </p:spPr>
         <p:txBody>
@@ -1733,7 +1737,7 @@
               <a:pPr>
                 <a:defRPr/>
               </a:pPr>
-              <a:t>2/4/2013</a:t>
+              <a:t>2/5/2013</a:t>
             </a:fld>
             <a:endParaRPr lang="en-US" dirty="0"/>
           </a:p>
@@ -1839,7 +1843,7 @@
         <p:spPr bwMode="ltGray">
           <a:xfrm>
             <a:off x="0" y="1"/>
-            <a:ext cx="9144000" cy="2602520"/>
+            <a:ext cx="9144000" cy="2168767"/>
           </a:xfrm>
           <a:prstGeom prst="rect">
             <a:avLst/>
@@ -1885,8 +1889,8 @@
         </p:nvSpPr>
         <p:spPr bwMode="invGray">
           <a:xfrm>
-            <a:off x="0" y="2602520"/>
-            <a:ext cx="9144000" cy="45720"/>
+            <a:off x="0" y="2168767"/>
+            <a:ext cx="9144000" cy="38100"/>
           </a:xfrm>
           <a:prstGeom prst="rect">
             <a:avLst/>
@@ -1943,8 +1947,8 @@
         </p:nvSpPr>
         <p:spPr>
           <a:xfrm>
-            <a:off x="749808" y="118872"/>
-            <a:ext cx="8013192" cy="1636776"/>
+            <a:off x="749808" y="99060"/>
+            <a:ext cx="8013192" cy="1363980"/>
           </a:xfrm>
         </p:spPr>
         <p:txBody>
@@ -1987,8 +1991,8 @@
         </p:nvSpPr>
         <p:spPr>
           <a:xfrm>
-            <a:off x="740664" y="1828800"/>
-            <a:ext cx="8022336" cy="685800"/>
+            <a:off x="740664" y="1524000"/>
+            <a:ext cx="8022336" cy="571500"/>
           </a:xfrm>
         </p:spPr>
         <p:txBody>
@@ -2116,7 +2120,7 @@
               <a:pPr>
                 <a:defRPr/>
               </a:pPr>
-              <a:t>2/4/2013</a:t>
+              <a:t>2/5/2013</a:t>
             </a:fld>
             <a:endParaRPr lang="en-US"/>
           </a:p>
@@ -2245,8 +2249,8 @@
         </p:nvSpPr>
         <p:spPr>
           <a:xfrm>
-            <a:off x="457200" y="1773936"/>
-            <a:ext cx="4038600" cy="4623816"/>
+            <a:off x="457200" y="1478280"/>
+            <a:ext cx="4038600" cy="3853180"/>
           </a:xfrm>
         </p:spPr>
         <p:txBody>
@@ -2331,8 +2335,8 @@
         </p:nvSpPr>
         <p:spPr>
           <a:xfrm>
-            <a:off x="4648200" y="1773936"/>
-            <a:ext cx="4038600" cy="4623816"/>
+            <a:off x="4648200" y="1478280"/>
+            <a:ext cx="4038600" cy="3853180"/>
           </a:xfrm>
         </p:spPr>
         <p:txBody>
@@ -2428,7 +2432,7 @@
               <a:pPr>
                 <a:defRPr/>
               </a:pPr>
-              <a:t>2/4/2013</a:t>
+              <a:t>2/5/2013</a:t>
             </a:fld>
             <a:endParaRPr lang="en-US" dirty="0"/>
           </a:p>
@@ -2560,8 +2564,8 @@
         </p:nvSpPr>
         <p:spPr>
           <a:xfrm>
-            <a:off x="457200" y="1698987"/>
-            <a:ext cx="4040188" cy="715355"/>
+            <a:off x="457200" y="1415823"/>
+            <a:ext cx="4040188" cy="596129"/>
           </a:xfrm>
         </p:spPr>
         <p:txBody>
@@ -2626,8 +2630,8 @@
         </p:nvSpPr>
         <p:spPr>
           <a:xfrm>
-            <a:off x="457200" y="2449512"/>
-            <a:ext cx="4040188" cy="3951288"/>
+            <a:off x="457200" y="2041260"/>
+            <a:ext cx="4040188" cy="3292740"/>
           </a:xfrm>
         </p:spPr>
         <p:txBody>
@@ -2712,8 +2716,8 @@
         </p:nvSpPr>
         <p:spPr>
           <a:xfrm>
-            <a:off x="4645025" y="1698987"/>
-            <a:ext cx="4041775" cy="715355"/>
+            <a:off x="4645026" y="1415823"/>
+            <a:ext cx="4041775" cy="596129"/>
           </a:xfrm>
         </p:spPr>
         <p:txBody>
@@ -2778,8 +2782,8 @@
         </p:nvSpPr>
         <p:spPr>
           <a:xfrm>
-            <a:off x="4645025" y="2449512"/>
-            <a:ext cx="4041775" cy="3951288"/>
+            <a:off x="4645026" y="2041260"/>
+            <a:ext cx="4041775" cy="3292740"/>
           </a:xfrm>
         </p:spPr>
         <p:txBody>
@@ -2875,7 +2879,7 @@
               <a:pPr>
                 <a:defRPr/>
               </a:pPr>
-              <a:t>2/4/2013</a:t>
+              <a:t>2/5/2013</a:t>
             </a:fld>
             <a:endParaRPr lang="en-US" dirty="0"/>
           </a:p>
@@ -3015,7 +3019,7 @@
               <a:pPr>
                 <a:defRPr/>
               </a:pPr>
-              <a:t>2/4/2013</a:t>
+              <a:t>2/5/2013</a:t>
             </a:fld>
             <a:endParaRPr lang="en-US" dirty="0"/>
           </a:p>
@@ -3130,7 +3134,7 @@
               <a:pPr>
                 <a:defRPr/>
               </a:pPr>
-              <a:t>2/4/2013</a:t>
+              <a:t>2/5/2013</a:t>
             </a:fld>
             <a:endParaRPr lang="en-US" dirty="0"/>
           </a:p>
@@ -3234,8 +3238,8 @@
         </p:nvSpPr>
         <p:spPr>
           <a:xfrm>
-            <a:off x="167838" y="152400"/>
-            <a:ext cx="2523744" cy="978408"/>
+            <a:off x="167838" y="127000"/>
+            <a:ext cx="2523744" cy="815340"/>
           </a:xfrm>
         </p:spPr>
         <p:txBody>
@@ -3270,8 +3274,8 @@
         </p:nvSpPr>
         <p:spPr>
           <a:xfrm>
-            <a:off x="3019377" y="1743133"/>
-            <a:ext cx="5920641" cy="4558885"/>
+            <a:off x="3019378" y="1452611"/>
+            <a:ext cx="5920641" cy="3799071"/>
           </a:xfrm>
         </p:spPr>
         <p:txBody>
@@ -3356,8 +3360,8 @@
         </p:nvSpPr>
         <p:spPr>
           <a:xfrm>
-            <a:off x="167838" y="1730018"/>
-            <a:ext cx="2468880" cy="4572000"/>
+            <a:off x="167838" y="1441682"/>
+            <a:ext cx="2468880" cy="3810000"/>
           </a:xfrm>
         </p:spPr>
         <p:txBody>
@@ -3433,7 +3437,7 @@
               <a:pPr>
                 <a:defRPr/>
               </a:pPr>
-              <a:t>2/4/2013</a:t>
+              <a:t>2/5/2013</a:t>
             </a:fld>
             <a:endParaRPr lang="en-US" dirty="0"/>
           </a:p>
@@ -3499,7 +3503,7 @@
         <p:spPr bwMode="invGray">
           <a:xfrm>
             <a:off x="2855737" y="0"/>
-            <a:ext cx="45720" cy="1453896"/>
+            <a:ext cx="45720" cy="1211580"/>
           </a:xfrm>
           <a:prstGeom prst="rect">
             <a:avLst/>
@@ -3546,7 +3550,7 @@
         <p:spPr bwMode="invGray">
           <a:xfrm>
             <a:off x="2855737" y="0"/>
-            <a:ext cx="45720" cy="1453896"/>
+            <a:ext cx="45720" cy="1211580"/>
           </a:xfrm>
           <a:prstGeom prst="rect">
             <a:avLst/>
@@ -3636,8 +3640,8 @@
         </p:nvSpPr>
         <p:spPr>
           <a:xfrm>
-            <a:off x="164592" y="155448"/>
-            <a:ext cx="2525150" cy="978408"/>
+            <a:off x="164592" y="129540"/>
+            <a:ext cx="2525150" cy="815340"/>
           </a:xfrm>
         </p:spPr>
         <p:txBody>
@@ -3671,8 +3675,8 @@
         </p:nvSpPr>
         <p:spPr>
           <a:xfrm>
-            <a:off x="2903805" y="1484808"/>
-            <a:ext cx="6247397" cy="5373192"/>
+            <a:off x="2903806" y="1237340"/>
+            <a:ext cx="6247397" cy="4477660"/>
           </a:xfrm>
           <a:solidFill>
             <a:schemeClr val="bg2">
@@ -3742,8 +3746,8 @@
         </p:nvSpPr>
         <p:spPr>
           <a:xfrm>
-            <a:off x="164592" y="1728216"/>
-            <a:ext cx="2468880" cy="4572000"/>
+            <a:off x="164592" y="1440180"/>
+            <a:ext cx="2468880" cy="3810000"/>
           </a:xfrm>
         </p:spPr>
         <p:txBody>
@@ -3808,8 +3812,8 @@
         </p:nvSpPr>
         <p:spPr>
           <a:xfrm>
-            <a:off x="164592" y="1170432"/>
-            <a:ext cx="2523744" cy="201168"/>
+            <a:off x="164592" y="975360"/>
+            <a:ext cx="2523744" cy="167640"/>
           </a:xfrm>
         </p:spPr>
         <p:txBody>
@@ -3824,7 +3828,7 @@
               <a:pPr>
                 <a:defRPr/>
               </a:pPr>
-              <a:t>2/4/2013</a:t>
+              <a:t>2/5/2013</a:t>
             </a:fld>
             <a:endParaRPr lang="en-US"/>
           </a:p>
@@ -3839,7 +3843,7 @@
         <p:spPr>
           <a:xfrm>
             <a:off x="2855737" y="0"/>
-            <a:ext cx="45720" cy="6858000"/>
+            <a:ext cx="45720" cy="5715000"/>
           </a:xfrm>
           <a:prstGeom prst="rect">
             <a:avLst/>
@@ -3886,7 +3890,7 @@
         <p:spPr bwMode="invGray">
           <a:xfrm>
             <a:off x="2855737" y="0"/>
-            <a:ext cx="45720" cy="6858000"/>
+            <a:ext cx="45720" cy="5715000"/>
           </a:xfrm>
           <a:prstGeom prst="rect">
             <a:avLst/>
@@ -3936,8 +3940,8 @@
         </p:nvSpPr>
         <p:spPr>
           <a:xfrm>
-            <a:off x="3035808" y="1170432"/>
-            <a:ext cx="5193792" cy="201168"/>
+            <a:off x="3035808" y="975360"/>
+            <a:ext cx="5193792" cy="167640"/>
           </a:xfrm>
         </p:spPr>
         <p:txBody>
@@ -3973,8 +3977,8 @@
         </p:nvSpPr>
         <p:spPr>
           <a:xfrm>
-            <a:off x="8339328" y="1170432"/>
-            <a:ext cx="733864" cy="201168"/>
+            <a:off x="8339328" y="975360"/>
+            <a:ext cx="733864" cy="167640"/>
           </a:xfrm>
         </p:spPr>
         <p:txBody>
@@ -4043,8 +4047,8 @@
         </p:nvSpPr>
         <p:spPr bwMode="invGray">
           <a:xfrm>
-            <a:off x="0" y="1435895"/>
-            <a:ext cx="9144000" cy="45720"/>
+            <a:off x="0" y="1196579"/>
+            <a:ext cx="9144000" cy="38100"/>
           </a:xfrm>
           <a:prstGeom prst="rect">
             <a:avLst/>
@@ -4097,8 +4101,8 @@
         </p:nvSpPr>
         <p:spPr bwMode="ltGray">
           <a:xfrm>
-            <a:off x="0" y="0"/>
-            <a:ext cx="9143999" cy="1433733"/>
+            <a:off x="1" y="0"/>
+            <a:ext cx="9143999" cy="1194778"/>
           </a:xfrm>
           <a:prstGeom prst="rect">
             <a:avLst/>
@@ -4148,8 +4152,8 @@
         </p:nvSpPr>
         <p:spPr>
           <a:xfrm>
-            <a:off x="457200" y="152400"/>
-            <a:ext cx="8229600" cy="1251062"/>
+            <a:off x="457200" y="127000"/>
+            <a:ext cx="8229600" cy="1042552"/>
           </a:xfrm>
           <a:prstGeom prst="rect">
             <a:avLst/>
@@ -4192,8 +4196,8 @@
         </p:nvSpPr>
         <p:spPr>
           <a:xfrm>
-            <a:off x="457200" y="1775191"/>
-            <a:ext cx="8229600" cy="4625609"/>
+            <a:off x="457200" y="1479326"/>
+            <a:ext cx="8229600" cy="3854674"/>
           </a:xfrm>
           <a:prstGeom prst="rect">
             <a:avLst/>
@@ -4256,8 +4260,8 @@
         </p:nvSpPr>
         <p:spPr>
           <a:xfrm>
-            <a:off x="457200" y="6476999"/>
-            <a:ext cx="2133600" cy="274320"/>
+            <a:off x="457200" y="5397499"/>
+            <a:ext cx="2133600" cy="228600"/>
           </a:xfrm>
           <a:prstGeom prst="rect">
             <a:avLst/>
@@ -4286,7 +4290,7 @@
               <a:pPr>
                 <a:defRPr/>
               </a:pPr>
-              <a:t>2/4/2013</a:t>
+              <a:t>2/5/2013</a:t>
             </a:fld>
             <a:endParaRPr lang="en-US" dirty="0"/>
           </a:p>
@@ -4304,8 +4308,8 @@
         </p:nvSpPr>
         <p:spPr>
           <a:xfrm>
-            <a:off x="2640596" y="6476999"/>
-            <a:ext cx="5507719" cy="274320"/>
+            <a:off x="2640597" y="5397499"/>
+            <a:ext cx="5507719" cy="228600"/>
           </a:xfrm>
           <a:prstGeom prst="rect">
             <a:avLst/>
@@ -4345,8 +4349,8 @@
         </p:nvSpPr>
         <p:spPr>
           <a:xfrm>
-            <a:off x="8204396" y="6476999"/>
-            <a:ext cx="733864" cy="274320"/>
+            <a:off x="8204396" y="5397499"/>
+            <a:ext cx="733864" cy="228600"/>
           </a:xfrm>
           <a:prstGeom prst="rect">
             <a:avLst/>
@@ -4743,7 +4747,6 @@
               <a:rPr lang="en-US" sz="3600" dirty="0"/>
               <a:t>Advice From the 2013 Software Craftsmanship Calendar</a:t>
             </a:r>
-            <a:endParaRPr lang="en-US" sz="3600" dirty="0"/>
           </a:p>
         </p:txBody>
       </p:sp>
@@ -4824,13 +4827,91 @@
           <a:chExt cx="0" cy="0"/>
         </a:xfrm>
       </p:grpSpPr>
+      <p:sp>
+        <p:nvSpPr>
+          <p:cNvPr id="11" name="Title 10"/>
+          <p:cNvSpPr>
+            <a:spLocks noGrp="1"/>
+          </p:cNvSpPr>
+          <p:nvPr>
+            <p:ph type="title"/>
+          </p:nvPr>
+        </p:nvSpPr>
+        <p:spPr/>
+        <p:txBody>
+          <a:bodyPr/>
+          <a:lstStyle/>
+          <a:p>
+            <a:r>
+              <a:rPr lang="en-US" dirty="0" smtClean="0"/>
+              <a:t>SOLID</a:t>
+            </a:r>
+            <a:endParaRPr lang="en-US" dirty="0"/>
+          </a:p>
+        </p:txBody>
+      </p:sp>
+      <p:sp>
+        <p:nvSpPr>
+          <p:cNvPr id="10" name="Text Placeholder 9"/>
+          <p:cNvSpPr>
+            <a:spLocks noGrp="1"/>
+          </p:cNvSpPr>
+          <p:nvPr>
+            <p:ph sz="half" idx="2"/>
+          </p:nvPr>
+        </p:nvSpPr>
+        <p:spPr>
+          <a:xfrm>
+            <a:off x="4495800" y="1478280"/>
+            <a:ext cx="4191000" cy="3853180"/>
+          </a:xfrm>
+        </p:spPr>
+        <p:txBody>
+          <a:bodyPr>
+            <a:normAutofit/>
+          </a:bodyPr>
+          <a:lstStyle/>
+          <a:p>
+            <a:pPr marL="118872" indent="0">
+              <a:buNone/>
+            </a:pPr>
+            <a:r>
+              <a:rPr lang="en-US" i="1" dirty="0" smtClean="0"/>
+              <a:t>If I had to write commandments, these would be candidates.</a:t>
+            </a:r>
+            <a:endParaRPr lang="en-US" i="1" dirty="0"/>
+          </a:p>
+          <a:p>
+            <a:pPr marL="118872" indent="0" algn="r">
+              <a:buNone/>
+            </a:pPr>
+            <a:endParaRPr lang="en-US" dirty="0"/>
+          </a:p>
+          <a:p>
+            <a:pPr marL="118872" indent="0" algn="r">
+              <a:buNone/>
+            </a:pPr>
+            <a:r>
+              <a:rPr lang="en-US" dirty="0"/>
+              <a:t>― </a:t>
+            </a:r>
+            <a:r>
+              <a:rPr lang="en-US" dirty="0" smtClean="0"/>
+              <a:t>Robert Martin</a:t>
+            </a:r>
+            <a:endParaRPr lang="en-US" dirty="0"/>
+          </a:p>
+        </p:txBody>
+      </p:sp>
       <p:pic>
         <p:nvPicPr>
-          <p:cNvPr id="7172" name="Picture 4" descr="Hollywood Principle"/>
+          <p:cNvPr id="6" name="Picture 4" descr="Hollywood Principle"/>
           <p:cNvPicPr>
-            <a:picLocks noChangeAspect="1" noChangeArrowheads="1"/>
+            <a:picLocks noGrp="1" noChangeAspect="1" noChangeArrowheads="1"/>
           </p:cNvPicPr>
-          <p:nvPr/>
+          <p:nvPr>
+            <p:ph sz="half" idx="1"/>
+          </p:nvPr>
         </p:nvPicPr>
         <p:blipFill>
           <a:blip r:embed="rId2">
@@ -4847,8 +4928,8 @@
         </p:blipFill>
         <p:spPr bwMode="auto">
           <a:xfrm>
-            <a:off x="1828800" y="685800"/>
-            <a:ext cx="5486400" cy="5486400"/>
+            <a:off x="457200" y="1490472"/>
+            <a:ext cx="3657600" cy="3657600"/>
           </a:xfrm>
           <a:prstGeom prst="rect">
             <a:avLst/>
@@ -4868,7 +4949,7 @@
     </p:spTree>
     <p:extLst>
       <p:ext uri="{BB962C8B-B14F-4D97-AF65-F5344CB8AC3E}">
-        <p14:creationId xmlns:p14="http://schemas.microsoft.com/office/powerpoint/2010/main" val="4276356577"/>
+        <p14:creationId xmlns:p14="http://schemas.microsoft.com/office/powerpoint/2010/main" val="1893459768"/>
       </p:ext>
     </p:extLst>
   </p:cSld>
@@ -4928,7 +5009,7 @@
         </p:blipFill>
         <p:spPr bwMode="auto">
           <a:xfrm>
-            <a:off x="1000125" y="571500"/>
+            <a:off x="1000125" y="0"/>
             <a:ext cx="7143750" cy="5715000"/>
           </a:xfrm>
           <a:prstGeom prst="rect">
@@ -5009,7 +5090,7 @@
         </p:blipFill>
         <p:spPr bwMode="auto">
           <a:xfrm>
-            <a:off x="1000125" y="571500"/>
+            <a:off x="1000125" y="0"/>
             <a:ext cx="7143750" cy="5715000"/>
           </a:xfrm>
           <a:prstGeom prst="rect">
@@ -5090,7 +5171,7 @@
         </p:blipFill>
         <p:spPr bwMode="auto">
           <a:xfrm>
-            <a:off x="1000125" y="571500"/>
+            <a:off x="1000125" y="0"/>
             <a:ext cx="7143750" cy="5715000"/>
           </a:xfrm>
           <a:prstGeom prst="rect">
@@ -5171,7 +5252,7 @@
         </p:blipFill>
         <p:spPr bwMode="auto">
           <a:xfrm>
-            <a:off x="1000125" y="571500"/>
+            <a:off x="1000125" y="0"/>
             <a:ext cx="7143750" cy="5715000"/>
           </a:xfrm>
           <a:prstGeom prst="rect">
@@ -5252,7 +5333,7 @@
         </p:blipFill>
         <p:spPr bwMode="auto">
           <a:xfrm>
-            <a:off x="1000125" y="571500"/>
+            <a:off x="1000125" y="0"/>
             <a:ext cx="7143750" cy="5715000"/>
           </a:xfrm>
           <a:prstGeom prst="rect">
@@ -5333,7 +5414,7 @@
         </p:blipFill>
         <p:spPr bwMode="auto">
           <a:xfrm>
-            <a:off x="1000125" y="571500"/>
+            <a:off x="1000125" y="0"/>
             <a:ext cx="7143750" cy="5715000"/>
           </a:xfrm>
           <a:prstGeom prst="rect">
@@ -5391,13 +5472,91 @@
           <a:chExt cx="0" cy="0"/>
         </a:xfrm>
       </p:grpSpPr>
+      <p:sp>
+        <p:nvSpPr>
+          <p:cNvPr id="11" name="Title 10"/>
+          <p:cNvSpPr>
+            <a:spLocks noGrp="1"/>
+          </p:cNvSpPr>
+          <p:nvPr>
+            <p:ph type="title"/>
+          </p:nvPr>
+        </p:nvSpPr>
+        <p:spPr/>
+        <p:txBody>
+          <a:bodyPr/>
+          <a:lstStyle/>
+          <a:p>
+            <a:r>
+              <a:rPr lang="en-US" dirty="0" err="1" smtClean="0"/>
+              <a:t>Dogfooding</a:t>
+            </a:r>
+            <a:endParaRPr lang="en-US" dirty="0"/>
+          </a:p>
+        </p:txBody>
+      </p:sp>
+      <p:sp>
+        <p:nvSpPr>
+          <p:cNvPr id="10" name="Text Placeholder 9"/>
+          <p:cNvSpPr>
+            <a:spLocks noGrp="1"/>
+          </p:cNvSpPr>
+          <p:nvPr>
+            <p:ph sz="half" idx="2"/>
+          </p:nvPr>
+        </p:nvSpPr>
+        <p:spPr>
+          <a:xfrm>
+            <a:off x="4495800" y="1478280"/>
+            <a:ext cx="4191000" cy="3853180"/>
+          </a:xfrm>
+        </p:spPr>
+        <p:txBody>
+          <a:bodyPr>
+            <a:normAutofit lnSpcReduction="10000"/>
+          </a:bodyPr>
+          <a:lstStyle/>
+          <a:p>
+            <a:pPr marL="118872" indent="0">
+              <a:buNone/>
+            </a:pPr>
+            <a:r>
+              <a:rPr lang="en-US" i="1" dirty="0" smtClean="0"/>
+              <a:t>… nothing exudes confidence like software developers who are willing to stick their own extremities into the spinning blades of software they’ve written.</a:t>
+            </a:r>
+            <a:endParaRPr lang="en-US" i="1" dirty="0"/>
+          </a:p>
+          <a:p>
+            <a:pPr marL="118872" indent="0" algn="r">
+              <a:buNone/>
+            </a:pPr>
+            <a:endParaRPr lang="en-US" dirty="0"/>
+          </a:p>
+          <a:p>
+            <a:pPr marL="118872" indent="0" algn="r">
+              <a:buNone/>
+            </a:pPr>
+            <a:r>
+              <a:rPr lang="en-US" dirty="0"/>
+              <a:t>― </a:t>
+            </a:r>
+            <a:r>
+              <a:rPr lang="en-US" dirty="0" smtClean="0"/>
+              <a:t>Jeff Atwood</a:t>
+            </a:r>
+            <a:endParaRPr lang="en-US" dirty="0"/>
+          </a:p>
+        </p:txBody>
+      </p:sp>
       <p:pic>
         <p:nvPicPr>
-          <p:cNvPr id="8196" name="Picture 4" descr="Dogfooding"/>
+          <p:cNvPr id="7" name="Picture 4" descr="Dogfooding"/>
           <p:cNvPicPr>
-            <a:picLocks noChangeAspect="1" noChangeArrowheads="1"/>
+            <a:picLocks noGrp="1" noChangeAspect="1" noChangeArrowheads="1"/>
           </p:cNvPicPr>
-          <p:nvPr/>
+          <p:nvPr>
+            <p:ph sz="half" idx="1"/>
+          </p:nvPr>
         </p:nvPicPr>
         <p:blipFill>
           <a:blip r:embed="rId2">
@@ -5414,8 +5573,8 @@
         </p:blipFill>
         <p:spPr bwMode="auto">
           <a:xfrm>
-            <a:off x="1828800" y="685800"/>
-            <a:ext cx="5486400" cy="5486400"/>
+            <a:off x="457200" y="1490472"/>
+            <a:ext cx="3657600" cy="3657600"/>
           </a:xfrm>
           <a:prstGeom prst="rect">
             <a:avLst/>
@@ -5435,7 +5594,7 @@
     </p:spTree>
     <p:extLst>
       <p:ext uri="{BB962C8B-B14F-4D97-AF65-F5344CB8AC3E}">
-        <p14:creationId xmlns:p14="http://schemas.microsoft.com/office/powerpoint/2010/main" val="4276356577"/>
+        <p14:creationId xmlns:p14="http://schemas.microsoft.com/office/powerpoint/2010/main" val="47403949"/>
       </p:ext>
     </p:extLst>
   </p:cSld>
@@ -5472,13 +5631,106 @@
           <a:chExt cx="0" cy="0"/>
         </a:xfrm>
       </p:grpSpPr>
+      <p:sp>
+        <p:nvSpPr>
+          <p:cNvPr id="11" name="Title 10"/>
+          <p:cNvSpPr>
+            <a:spLocks noGrp="1"/>
+          </p:cNvSpPr>
+          <p:nvPr>
+            <p:ph type="title"/>
+          </p:nvPr>
+        </p:nvSpPr>
+        <p:spPr/>
+        <p:txBody>
+          <a:bodyPr/>
+          <a:lstStyle/>
+          <a:p>
+            <a:r>
+              <a:rPr lang="en-US" dirty="0" smtClean="0"/>
+              <a:t>Naming Things</a:t>
+            </a:r>
+            <a:endParaRPr lang="en-US" dirty="0"/>
+          </a:p>
+        </p:txBody>
+      </p:sp>
+      <p:sp>
+        <p:nvSpPr>
+          <p:cNvPr id="10" name="Text Placeholder 9"/>
+          <p:cNvSpPr>
+            <a:spLocks noGrp="1"/>
+          </p:cNvSpPr>
+          <p:nvPr>
+            <p:ph sz="half" idx="2"/>
+          </p:nvPr>
+        </p:nvSpPr>
+        <p:spPr>
+          <a:xfrm>
+            <a:off x="4495800" y="1478280"/>
+            <a:ext cx="4191000" cy="3853180"/>
+          </a:xfrm>
+        </p:spPr>
+        <p:txBody>
+          <a:bodyPr>
+            <a:normAutofit/>
+          </a:bodyPr>
+          <a:lstStyle/>
+          <a:p>
+            <a:pPr marL="118872" indent="0">
+              <a:buNone/>
+            </a:pPr>
+            <a:r>
+              <a:rPr lang="en-US" i="1" dirty="0" smtClean="0"/>
+              <a:t>There are only two hard things in Computer Science: cache invalidation, naming things and off-by-one-errors.</a:t>
+            </a:r>
+            <a:endParaRPr lang="en-US" i="1" dirty="0"/>
+          </a:p>
+          <a:p>
+            <a:pPr marL="118872" indent="0" algn="r">
+              <a:buNone/>
+            </a:pPr>
+            <a:endParaRPr lang="en-US" dirty="0"/>
+          </a:p>
+          <a:p>
+            <a:pPr marL="118872" indent="0" algn="r">
+              <a:buNone/>
+            </a:pPr>
+            <a:r>
+              <a:rPr lang="en-US" dirty="0"/>
+              <a:t>― </a:t>
+            </a:r>
+            <a:r>
+              <a:rPr lang="en-US" dirty="0" smtClean="0"/>
+              <a:t>Phil </a:t>
+            </a:r>
+            <a:r>
+              <a:rPr lang="en-US" dirty="0" err="1" smtClean="0"/>
+              <a:t>Karlton</a:t>
+            </a:r>
+            <a:r>
+              <a:rPr lang="en-US" dirty="0" smtClean="0"/>
+              <a:t/>
+            </a:r>
+            <a:br>
+              <a:rPr lang="en-US" dirty="0" smtClean="0"/>
+            </a:br>
+            <a:r>
+              <a:rPr lang="en-US" dirty="0" smtClean="0"/>
+              <a:t>(modified via Twitter)</a:t>
+            </a:r>
+            <a:endParaRPr lang="en-US" dirty="0"/>
+          </a:p>
+        </p:txBody>
+      </p:sp>
       <p:pic>
         <p:nvPicPr>
-          <p:cNvPr id="9220" name="Picture 4" descr="Naming Things"/>
+          <p:cNvPr id="6" name="Picture 4" descr="Naming Things"/>
           <p:cNvPicPr>
-            <a:picLocks noChangeAspect="1" noChangeArrowheads="1"/>
+            <a:picLocks noGrp="1" noChangeAspect="1" noChangeArrowheads="1"/>
           </p:cNvPicPr>
-          <p:nvPr/>
+          <p:nvPr>
+            <p:ph sz="half" idx="1"/>
+          </p:nvPr>
         </p:nvPicPr>
         <p:blipFill>
           <a:blip r:embed="rId2">
@@ -5495,8 +5747,8 @@
         </p:blipFill>
         <p:spPr bwMode="auto">
           <a:xfrm>
-            <a:off x="1828800" y="685800"/>
-            <a:ext cx="5486400" cy="5486400"/>
+            <a:off x="457200" y="1490472"/>
+            <a:ext cx="3657600" cy="3657600"/>
           </a:xfrm>
           <a:prstGeom prst="rect">
             <a:avLst/>
@@ -5516,7 +5768,7 @@
     </p:spTree>
     <p:extLst>
       <p:ext uri="{BB962C8B-B14F-4D97-AF65-F5344CB8AC3E}">
-        <p14:creationId xmlns:p14="http://schemas.microsoft.com/office/powerpoint/2010/main" val="4276356577"/>
+        <p14:creationId xmlns:p14="http://schemas.microsoft.com/office/powerpoint/2010/main" val="2859812211"/>
       </p:ext>
     </p:extLst>
   </p:cSld>
@@ -5553,13 +5805,107 @@
           <a:chExt cx="0" cy="0"/>
         </a:xfrm>
       </p:grpSpPr>
+      <p:sp>
+        <p:nvSpPr>
+          <p:cNvPr id="11" name="Title 10"/>
+          <p:cNvSpPr>
+            <a:spLocks noGrp="1"/>
+          </p:cNvSpPr>
+          <p:nvPr>
+            <p:ph type="title"/>
+          </p:nvPr>
+        </p:nvSpPr>
+        <p:spPr/>
+        <p:txBody>
+          <a:bodyPr/>
+          <a:lstStyle/>
+          <a:p>
+            <a:r>
+              <a:rPr lang="en-US" dirty="0" smtClean="0"/>
+              <a:t>YAGNI: You </a:t>
+            </a:r>
+            <a:r>
+              <a:rPr lang="en-US" dirty="0" err="1" smtClean="0"/>
+              <a:t>Ain’t</a:t>
+            </a:r>
+            <a:r>
+              <a:rPr lang="en-US" dirty="0" smtClean="0"/>
+              <a:t> </a:t>
+            </a:r>
+            <a:r>
+              <a:rPr lang="en-US" dirty="0" err="1" smtClean="0"/>
+              <a:t>Gonna</a:t>
+            </a:r>
+            <a:r>
+              <a:rPr lang="en-US" dirty="0" smtClean="0"/>
+              <a:t> Need It</a:t>
+            </a:r>
+            <a:endParaRPr lang="en-US" dirty="0"/>
+          </a:p>
+        </p:txBody>
+      </p:sp>
+      <p:sp>
+        <p:nvSpPr>
+          <p:cNvPr id="10" name="Text Placeholder 9"/>
+          <p:cNvSpPr>
+            <a:spLocks noGrp="1"/>
+          </p:cNvSpPr>
+          <p:nvPr>
+            <p:ph sz="half" idx="2"/>
+          </p:nvPr>
+        </p:nvSpPr>
+        <p:spPr>
+          <a:xfrm>
+            <a:off x="4495800" y="1478280"/>
+            <a:ext cx="4191000" cy="3853180"/>
+          </a:xfrm>
+        </p:spPr>
+        <p:txBody>
+          <a:bodyPr>
+            <a:normAutofit/>
+          </a:bodyPr>
+          <a:lstStyle/>
+          <a:p>
+            <a:pPr marL="118872" indent="0">
+              <a:buNone/>
+            </a:pPr>
+            <a:r>
+              <a:rPr lang="en-US" i="1" dirty="0" smtClean="0"/>
+              <a:t>The best way to have fewer bugs is to implement less code.</a:t>
+            </a:r>
+            <a:endParaRPr lang="en-US" i="1" dirty="0"/>
+          </a:p>
+          <a:p>
+            <a:pPr marL="118872" indent="0" algn="r">
+              <a:buNone/>
+            </a:pPr>
+            <a:endParaRPr lang="en-US" dirty="0"/>
+          </a:p>
+          <a:p>
+            <a:pPr marL="118872" indent="0" algn="r">
+              <a:buNone/>
+            </a:pPr>
+            <a:r>
+              <a:rPr lang="en-US" dirty="0"/>
+              <a:t>― </a:t>
+            </a:r>
+            <a:r>
+              <a:rPr lang="en-US" dirty="0" smtClean="0"/>
+              <a:t>Ron Jeffries</a:t>
+            </a:r>
+            <a:endParaRPr lang="en-US" dirty="0"/>
+          </a:p>
+        </p:txBody>
+      </p:sp>
       <p:pic>
         <p:nvPicPr>
-          <p:cNvPr id="10244" name="Picture 4" descr="YAGNI"/>
+          <p:cNvPr id="7" name="Picture 4" descr="YAGNI"/>
           <p:cNvPicPr>
-            <a:picLocks noChangeAspect="1" noChangeArrowheads="1"/>
+            <a:picLocks noGrp="1" noChangeAspect="1" noChangeArrowheads="1"/>
           </p:cNvPicPr>
-          <p:nvPr/>
+          <p:nvPr>
+            <p:ph sz="half" idx="1"/>
+          </p:nvPr>
         </p:nvPicPr>
         <p:blipFill>
           <a:blip r:embed="rId2">
@@ -5576,8 +5922,8 @@
         </p:blipFill>
         <p:spPr bwMode="auto">
           <a:xfrm>
-            <a:off x="1828800" y="685800"/>
-            <a:ext cx="5486400" cy="5486400"/>
+            <a:off x="457200" y="1490472"/>
+            <a:ext cx="3657600" cy="3657600"/>
           </a:xfrm>
           <a:prstGeom prst="rect">
             <a:avLst/>
@@ -5597,7 +5943,7 @@
     </p:spTree>
     <p:extLst>
       <p:ext uri="{BB962C8B-B14F-4D97-AF65-F5344CB8AC3E}">
-        <p14:creationId xmlns:p14="http://schemas.microsoft.com/office/powerpoint/2010/main" val="4276356577"/>
+        <p14:creationId xmlns:p14="http://schemas.microsoft.com/office/powerpoint/2010/main" val="4171991711"/>
       </p:ext>
     </p:extLst>
   </p:cSld>
@@ -5669,8 +6015,8 @@
         </p:nvSpPr>
         <p:spPr>
           <a:xfrm>
-            <a:off x="457200" y="1905000"/>
-            <a:ext cx="8229600" cy="4389438"/>
+            <a:off x="457200" y="1587500"/>
+            <a:ext cx="8229600" cy="3657865"/>
           </a:xfrm>
         </p:spPr>
         <p:txBody>
@@ -5764,8 +6110,8 @@
         </p:blipFill>
         <p:spPr bwMode="auto">
           <a:xfrm>
-            <a:off x="571500" y="5257800"/>
-            <a:ext cx="4991100" cy="981075"/>
+            <a:off x="571500" y="4381500"/>
+            <a:ext cx="4991100" cy="817563"/>
           </a:xfrm>
           <a:prstGeom prst="rect">
             <a:avLst/>
@@ -5796,8 +6142,8 @@
         </p:blipFill>
         <p:spPr bwMode="auto">
           <a:xfrm>
-            <a:off x="6324600" y="5334000"/>
-            <a:ext cx="2170364" cy="877900"/>
+            <a:off x="6324600" y="4445000"/>
+            <a:ext cx="2170364" cy="731583"/>
           </a:xfrm>
           <a:prstGeom prst="rect">
             <a:avLst/>
@@ -5822,8 +6168,8 @@
         </p:blipFill>
         <p:spPr bwMode="auto">
           <a:xfrm>
-            <a:off x="6533482" y="1828800"/>
-            <a:ext cx="1752600" cy="1271007"/>
+            <a:off x="6533482" y="1524000"/>
+            <a:ext cx="1752600" cy="1059173"/>
           </a:xfrm>
           <a:prstGeom prst="rect">
             <a:avLst/>
@@ -5872,13 +6218,95 @@
           <a:chExt cx="0" cy="0"/>
         </a:xfrm>
       </p:grpSpPr>
+      <p:sp>
+        <p:nvSpPr>
+          <p:cNvPr id="11" name="Title 10"/>
+          <p:cNvSpPr>
+            <a:spLocks noGrp="1"/>
+          </p:cNvSpPr>
+          <p:nvPr>
+            <p:ph type="title"/>
+          </p:nvPr>
+        </p:nvSpPr>
+        <p:spPr/>
+        <p:txBody>
+          <a:bodyPr/>
+          <a:lstStyle/>
+          <a:p>
+            <a:r>
+              <a:rPr lang="en-US" dirty="0" smtClean="0"/>
+              <a:t>Know Where You’re Going</a:t>
+            </a:r>
+            <a:endParaRPr lang="en-US" dirty="0"/>
+          </a:p>
+        </p:txBody>
+      </p:sp>
+      <p:sp>
+        <p:nvSpPr>
+          <p:cNvPr id="10" name="Text Placeholder 9"/>
+          <p:cNvSpPr>
+            <a:spLocks noGrp="1"/>
+          </p:cNvSpPr>
+          <p:nvPr>
+            <p:ph sz="half" idx="2"/>
+          </p:nvPr>
+        </p:nvSpPr>
+        <p:spPr>
+          <a:xfrm>
+            <a:off x="4495800" y="1478280"/>
+            <a:ext cx="4191000" cy="3853180"/>
+          </a:xfrm>
+        </p:spPr>
+        <p:txBody>
+          <a:bodyPr>
+            <a:normAutofit/>
+          </a:bodyPr>
+          <a:lstStyle/>
+          <a:p>
+            <a:pPr marL="118872" indent="0">
+              <a:buNone/>
+            </a:pPr>
+            <a:r>
+              <a:rPr lang="en-US" i="1" dirty="0" smtClean="0"/>
+              <a:t>Without requirements or design, programming is the art of adding bugs to an empty text file.</a:t>
+            </a:r>
+            <a:endParaRPr lang="en-US" i="1" dirty="0"/>
+          </a:p>
+          <a:p>
+            <a:pPr marL="118872" indent="0" algn="r">
+              <a:buNone/>
+            </a:pPr>
+            <a:endParaRPr lang="en-US" dirty="0"/>
+          </a:p>
+          <a:p>
+            <a:pPr marL="118872" indent="0" algn="r">
+              <a:buNone/>
+            </a:pPr>
+            <a:r>
+              <a:rPr lang="en-US" dirty="0"/>
+              <a:t>― </a:t>
+            </a:r>
+            <a:r>
+              <a:rPr lang="en-US" dirty="0" smtClean="0"/>
+              <a:t>Louis </a:t>
+            </a:r>
+            <a:r>
+              <a:rPr lang="en-US" dirty="0" err="1" smtClean="0"/>
+              <a:t>Srygley</a:t>
+            </a:r>
+            <a:endParaRPr lang="en-US" dirty="0"/>
+          </a:p>
+        </p:txBody>
+      </p:sp>
       <p:pic>
         <p:nvPicPr>
-          <p:cNvPr id="11268" name="Picture 4" descr="Know Where You're Going"/>
+          <p:cNvPr id="6" name="Picture 4" descr="Know Where You're Going"/>
           <p:cNvPicPr>
-            <a:picLocks noChangeAspect="1" noChangeArrowheads="1"/>
+            <a:picLocks noGrp="1" noChangeAspect="1" noChangeArrowheads="1"/>
           </p:cNvPicPr>
-          <p:nvPr/>
+          <p:nvPr>
+            <p:ph sz="half" idx="1"/>
+          </p:nvPr>
         </p:nvPicPr>
         <p:blipFill>
           <a:blip r:embed="rId2">
@@ -5895,8 +6323,8 @@
         </p:blipFill>
         <p:spPr bwMode="auto">
           <a:xfrm>
-            <a:off x="1828800" y="685800"/>
-            <a:ext cx="5486400" cy="5486400"/>
+            <a:off x="457200" y="1490472"/>
+            <a:ext cx="3657600" cy="3657600"/>
           </a:xfrm>
           <a:prstGeom prst="rect">
             <a:avLst/>
@@ -5916,7 +6344,7 @@
     </p:spTree>
     <p:extLst>
       <p:ext uri="{BB962C8B-B14F-4D97-AF65-F5344CB8AC3E}">
-        <p14:creationId xmlns:p14="http://schemas.microsoft.com/office/powerpoint/2010/main" val="4276356577"/>
+        <p14:creationId xmlns:p14="http://schemas.microsoft.com/office/powerpoint/2010/main" val="2343682817"/>
       </p:ext>
     </p:extLst>
   </p:cSld>
@@ -5953,13 +6381,91 @@
           <a:chExt cx="0" cy="0"/>
         </a:xfrm>
       </p:grpSpPr>
+      <p:sp>
+        <p:nvSpPr>
+          <p:cNvPr id="11" name="Title 10"/>
+          <p:cNvSpPr>
+            <a:spLocks noGrp="1"/>
+          </p:cNvSpPr>
+          <p:nvPr>
+            <p:ph type="title"/>
+          </p:nvPr>
+        </p:nvSpPr>
+        <p:spPr/>
+        <p:txBody>
+          <a:bodyPr/>
+          <a:lstStyle/>
+          <a:p>
+            <a:r>
+              <a:rPr lang="en-US" dirty="0" smtClean="0"/>
+              <a:t>Code Readability</a:t>
+            </a:r>
+            <a:endParaRPr lang="en-US" dirty="0"/>
+          </a:p>
+        </p:txBody>
+      </p:sp>
+      <p:sp>
+        <p:nvSpPr>
+          <p:cNvPr id="10" name="Text Placeholder 9"/>
+          <p:cNvSpPr>
+            <a:spLocks noGrp="1"/>
+          </p:cNvSpPr>
+          <p:nvPr>
+            <p:ph sz="half" idx="2"/>
+          </p:nvPr>
+        </p:nvSpPr>
+        <p:spPr>
+          <a:xfrm>
+            <a:off x="4495800" y="1478280"/>
+            <a:ext cx="4191000" cy="3853180"/>
+          </a:xfrm>
+        </p:spPr>
+        <p:txBody>
+          <a:bodyPr>
+            <a:normAutofit/>
+          </a:bodyPr>
+          <a:lstStyle/>
+          <a:p>
+            <a:pPr marL="118872" indent="0">
+              <a:buNone/>
+            </a:pPr>
+            <a:r>
+              <a:rPr lang="en-US" i="1" dirty="0" smtClean="0"/>
+              <a:t>Any fool can write code that a computer can understand. Good programmers write code that humans can understand.</a:t>
+            </a:r>
+            <a:endParaRPr lang="en-US" i="1" dirty="0"/>
+          </a:p>
+          <a:p>
+            <a:pPr marL="118872" indent="0" algn="r">
+              <a:buNone/>
+            </a:pPr>
+            <a:endParaRPr lang="en-US" dirty="0"/>
+          </a:p>
+          <a:p>
+            <a:pPr marL="118872" indent="0" algn="r">
+              <a:buNone/>
+            </a:pPr>
+            <a:r>
+              <a:rPr lang="en-US" dirty="0"/>
+              <a:t>― </a:t>
+            </a:r>
+            <a:r>
+              <a:rPr lang="en-US" dirty="0" smtClean="0"/>
+              <a:t>Martin Fowler</a:t>
+            </a:r>
+            <a:endParaRPr lang="en-US" dirty="0"/>
+          </a:p>
+        </p:txBody>
+      </p:sp>
       <p:pic>
         <p:nvPicPr>
-          <p:cNvPr id="12292" name="Picture 4" descr="Code Readability"/>
+          <p:cNvPr id="7" name="Picture 4" descr="Code Readability"/>
           <p:cNvPicPr>
-            <a:picLocks noChangeAspect="1" noChangeArrowheads="1"/>
+            <a:picLocks noGrp="1" noChangeAspect="1" noChangeArrowheads="1"/>
           </p:cNvPicPr>
-          <p:nvPr/>
+          <p:nvPr>
+            <p:ph sz="half" idx="1"/>
+          </p:nvPr>
         </p:nvPicPr>
         <p:blipFill>
           <a:blip r:embed="rId2">
@@ -5976,8 +6482,8 @@
         </p:blipFill>
         <p:spPr bwMode="auto">
           <a:xfrm>
-            <a:off x="1828800" y="685800"/>
-            <a:ext cx="5486400" cy="5486400"/>
+            <a:off x="457200" y="1490472"/>
+            <a:ext cx="3657600" cy="3657600"/>
           </a:xfrm>
           <a:prstGeom prst="rect">
             <a:avLst/>
@@ -5997,7 +6503,7 @@
     </p:spTree>
     <p:extLst>
       <p:ext uri="{BB962C8B-B14F-4D97-AF65-F5344CB8AC3E}">
-        <p14:creationId xmlns:p14="http://schemas.microsoft.com/office/powerpoint/2010/main" val="4276356577"/>
+        <p14:creationId xmlns:p14="http://schemas.microsoft.com/office/powerpoint/2010/main" val="598011158"/>
       </p:ext>
     </p:extLst>
   </p:cSld>
@@ -6266,13 +6772,38 @@
           <a:chExt cx="0" cy="0"/>
         </a:xfrm>
       </p:grpSpPr>
+      <p:sp>
+        <p:nvSpPr>
+          <p:cNvPr id="11" name="Title 10"/>
+          <p:cNvSpPr>
+            <a:spLocks noGrp="1"/>
+          </p:cNvSpPr>
+          <p:nvPr>
+            <p:ph type="title"/>
+          </p:nvPr>
+        </p:nvSpPr>
+        <p:spPr/>
+        <p:txBody>
+          <a:bodyPr/>
+          <a:lstStyle/>
+          <a:p>
+            <a:r>
+              <a:rPr lang="en-US" dirty="0" smtClean="0"/>
+              <a:t>KISS: Keep It Simple (Stupid)</a:t>
+            </a:r>
+            <a:endParaRPr lang="en-US" dirty="0"/>
+          </a:p>
+        </p:txBody>
+      </p:sp>
       <p:pic>
         <p:nvPicPr>
-          <p:cNvPr id="1028" name="Picture 4" descr="Calendar Coder"/>
+          <p:cNvPr id="12" name="Picture 4" descr="Calendar Coder"/>
           <p:cNvPicPr>
-            <a:picLocks noChangeAspect="1" noChangeArrowheads="1"/>
+            <a:picLocks noGrp="1" noChangeAspect="1" noChangeArrowheads="1"/>
           </p:cNvPicPr>
-          <p:nvPr/>
+          <p:nvPr>
+            <p:ph sz="half" idx="1"/>
+          </p:nvPr>
         </p:nvPicPr>
         <p:blipFill>
           <a:blip r:embed="rId2">
@@ -6282,15 +6813,14 @@
               </a:ext>
             </a:extLst>
           </a:blip>
-          <a:srcRect/>
           <a:stretch>
             <a:fillRect/>
           </a:stretch>
         </p:blipFill>
         <p:spPr bwMode="auto">
           <a:xfrm>
-            <a:off x="1828800" y="685800"/>
-            <a:ext cx="5486400" cy="5486400"/>
+            <a:off x="457200" y="1485899"/>
+            <a:ext cx="3657600" cy="3657600"/>
           </a:xfrm>
           <a:prstGeom prst="rect">
             <a:avLst/>
@@ -6307,6 +6837,54 @@
           </a:extLst>
         </p:spPr>
       </p:pic>
+      <p:sp>
+        <p:nvSpPr>
+          <p:cNvPr id="10" name="Text Placeholder 9"/>
+          <p:cNvSpPr>
+            <a:spLocks noGrp="1"/>
+          </p:cNvSpPr>
+          <p:nvPr>
+            <p:ph sz="half" idx="2"/>
+          </p:nvPr>
+        </p:nvSpPr>
+        <p:spPr>
+          <a:xfrm>
+            <a:off x="4495800" y="1478280"/>
+            <a:ext cx="4191000" cy="3853180"/>
+          </a:xfrm>
+        </p:spPr>
+        <p:txBody>
+          <a:bodyPr>
+            <a:normAutofit lnSpcReduction="10000"/>
+          </a:bodyPr>
+          <a:lstStyle/>
+          <a:p>
+            <a:pPr marL="118872" indent="0">
+              <a:buNone/>
+            </a:pPr>
+            <a:r>
+              <a:rPr lang="en-US" i="1" dirty="0" smtClean="0"/>
+              <a:t>Debugging is twice as hard as writing the code in the first place. Therefore, if you write the code as cleverly as possible, you are, by definition, not smart enough to debug it.</a:t>
+            </a:r>
+          </a:p>
+          <a:p>
+            <a:pPr marL="118872" indent="0" algn="r">
+              <a:buNone/>
+            </a:pPr>
+            <a:endParaRPr lang="en-US" dirty="0"/>
+          </a:p>
+          <a:p>
+            <a:pPr marL="118872" indent="0" algn="r">
+              <a:buNone/>
+            </a:pPr>
+            <a:r>
+              <a:rPr lang="en-US" dirty="0" smtClean="0"/>
+              <a:t>― Brian Kernighan</a:t>
+            </a:r>
+            <a:endParaRPr lang="en-US" dirty="0"/>
+          </a:p>
+        </p:txBody>
+      </p:sp>
     </p:spTree>
     <p:extLst>
       <p:ext uri="{BB962C8B-B14F-4D97-AF65-F5344CB8AC3E}">
@@ -6347,13 +6925,97 @@
           <a:chExt cx="0" cy="0"/>
         </a:xfrm>
       </p:grpSpPr>
+      <p:sp>
+        <p:nvSpPr>
+          <p:cNvPr id="11" name="Title 10"/>
+          <p:cNvSpPr>
+            <a:spLocks noGrp="1"/>
+          </p:cNvSpPr>
+          <p:nvPr>
+            <p:ph type="title"/>
+          </p:nvPr>
+        </p:nvSpPr>
+        <p:spPr/>
+        <p:txBody>
+          <a:bodyPr/>
+          <a:lstStyle/>
+          <a:p>
+            <a:r>
+              <a:rPr lang="en-US" dirty="0"/>
+              <a:t>Separation of Concerns</a:t>
+            </a:r>
+          </a:p>
+        </p:txBody>
+      </p:sp>
+      <p:sp>
+        <p:nvSpPr>
+          <p:cNvPr id="10" name="Text Placeholder 9"/>
+          <p:cNvSpPr>
+            <a:spLocks noGrp="1"/>
+          </p:cNvSpPr>
+          <p:nvPr>
+            <p:ph sz="half" idx="2"/>
+          </p:nvPr>
+        </p:nvSpPr>
+        <p:spPr>
+          <a:xfrm>
+            <a:off x="4495800" y="1478280"/>
+            <a:ext cx="4191000" cy="3853180"/>
+          </a:xfrm>
+        </p:spPr>
+        <p:txBody>
+          <a:bodyPr>
+            <a:normAutofit/>
+          </a:bodyPr>
+          <a:lstStyle/>
+          <a:p>
+            <a:pPr marL="118872" indent="0">
+              <a:buNone/>
+            </a:pPr>
+            <a:r>
+              <a:rPr lang="en-US" i="1" dirty="0"/>
+              <a:t>…even if not perfectly possible, [separation of concerns] is yet the only available technique for effective ordering of one’s thoughts.</a:t>
+            </a:r>
+          </a:p>
+          <a:p>
+            <a:pPr marL="118872" indent="0" algn="r">
+              <a:buNone/>
+            </a:pPr>
+            <a:endParaRPr lang="en-US" dirty="0"/>
+          </a:p>
+          <a:p>
+            <a:pPr marL="118872" indent="0" algn="r">
+              <a:buNone/>
+            </a:pPr>
+            <a:r>
+              <a:rPr lang="en-US" dirty="0"/>
+              <a:t>― </a:t>
+            </a:r>
+            <a:r>
+              <a:rPr lang="en-US" dirty="0" err="1"/>
+              <a:t>Edsger</a:t>
+            </a:r>
+            <a:r>
+              <a:rPr lang="en-US" dirty="0"/>
+              <a:t> W. </a:t>
+            </a:r>
+            <a:r>
+              <a:rPr lang="en-US" dirty="0" err="1"/>
+              <a:t>Dijkstra</a:t>
+            </a:r>
+            <a:endParaRPr lang="en-US" dirty="0"/>
+          </a:p>
+        </p:txBody>
+      </p:sp>
       <p:pic>
         <p:nvPicPr>
-          <p:cNvPr id="2052" name="Picture 4" descr="Separation of Concerns"/>
+          <p:cNvPr id="7" name="Content Placeholder 6" descr="Separation of Concerns"/>
           <p:cNvPicPr>
-            <a:picLocks noChangeAspect="1" noChangeArrowheads="1"/>
+            <a:picLocks noGrp="1" noChangeAspect="1" noChangeArrowheads="1"/>
           </p:cNvPicPr>
-          <p:nvPr/>
+          <p:nvPr>
+            <p:ph sz="half" idx="1"/>
+          </p:nvPr>
         </p:nvPicPr>
         <p:blipFill>
           <a:blip r:embed="rId2">
@@ -6370,8 +7032,8 @@
         </p:blipFill>
         <p:spPr bwMode="auto">
           <a:xfrm>
-            <a:off x="1828800" y="685800"/>
-            <a:ext cx="5486400" cy="5486400"/>
+            <a:off x="457200" y="1485900"/>
+            <a:ext cx="3657600" cy="3657600"/>
           </a:xfrm>
           <a:prstGeom prst="rect">
             <a:avLst/>
@@ -6391,7 +7053,7 @@
     </p:spTree>
     <p:extLst>
       <p:ext uri="{BB962C8B-B14F-4D97-AF65-F5344CB8AC3E}">
-        <p14:creationId xmlns:p14="http://schemas.microsoft.com/office/powerpoint/2010/main" val="3807475577"/>
+        <p14:creationId xmlns:p14="http://schemas.microsoft.com/office/powerpoint/2010/main" val="1758726354"/>
       </p:ext>
     </p:extLst>
   </p:cSld>
@@ -6428,13 +7090,91 @@
           <a:chExt cx="0" cy="0"/>
         </a:xfrm>
       </p:grpSpPr>
+      <p:sp>
+        <p:nvSpPr>
+          <p:cNvPr id="11" name="Title 10"/>
+          <p:cNvSpPr>
+            <a:spLocks noGrp="1"/>
+          </p:cNvSpPr>
+          <p:nvPr>
+            <p:ph type="title"/>
+          </p:nvPr>
+        </p:nvSpPr>
+        <p:spPr/>
+        <p:txBody>
+          <a:bodyPr/>
+          <a:lstStyle/>
+          <a:p>
+            <a:r>
+              <a:rPr lang="en-US" dirty="0" smtClean="0"/>
+              <a:t>RTFM: Read the Manual, Please</a:t>
+            </a:r>
+            <a:endParaRPr lang="en-US" dirty="0"/>
+          </a:p>
+        </p:txBody>
+      </p:sp>
+      <p:sp>
+        <p:nvSpPr>
+          <p:cNvPr id="10" name="Text Placeholder 9"/>
+          <p:cNvSpPr>
+            <a:spLocks noGrp="1"/>
+          </p:cNvSpPr>
+          <p:nvPr>
+            <p:ph sz="half" idx="2"/>
+          </p:nvPr>
+        </p:nvSpPr>
+        <p:spPr>
+          <a:xfrm>
+            <a:off x="4495800" y="1478280"/>
+            <a:ext cx="4191000" cy="3853180"/>
+          </a:xfrm>
+        </p:spPr>
+        <p:txBody>
+          <a:bodyPr>
+            <a:normAutofit/>
+          </a:bodyPr>
+          <a:lstStyle/>
+          <a:p>
+            <a:pPr marL="118872" indent="0">
+              <a:buNone/>
+            </a:pPr>
+            <a:r>
+              <a:rPr lang="en-US" i="1" dirty="0" smtClean="0"/>
+              <a:t>Life is too short for man pages, but occasionally much too short without them.</a:t>
+            </a:r>
+            <a:endParaRPr lang="en-US" i="1" dirty="0"/>
+          </a:p>
+          <a:p>
+            <a:pPr marL="118872" indent="0" algn="r">
+              <a:buNone/>
+            </a:pPr>
+            <a:endParaRPr lang="en-US" dirty="0"/>
+          </a:p>
+          <a:p>
+            <a:pPr marL="118872" indent="0" algn="r">
+              <a:buNone/>
+            </a:pPr>
+            <a:r>
+              <a:rPr lang="en-US" dirty="0"/>
+              <a:t>― </a:t>
+            </a:r>
+            <a:r>
+              <a:rPr lang="en-US" dirty="0" smtClean="0"/>
+              <a:t>XDCD #293</a:t>
+            </a:r>
+            <a:endParaRPr lang="en-US" dirty="0"/>
+          </a:p>
+        </p:txBody>
+      </p:sp>
       <p:pic>
         <p:nvPicPr>
-          <p:cNvPr id="3076" name="Picture 4" descr="Read The Manual"/>
-          <p:cNvPicPr>
-            <a:picLocks noChangeAspect="1" noChangeArrowheads="1"/>
+          <p:cNvPr id="6" name="Picture 4" descr="Read The Manual"/>
+          <p:cNvPicPr preferRelativeResize="0">
+            <a:picLocks noGrp="1" noChangeAspect="1" noChangeArrowheads="1"/>
           </p:cNvPicPr>
-          <p:nvPr/>
+          <p:nvPr>
+            <p:ph sz="half" idx="1"/>
+          </p:nvPr>
         </p:nvPicPr>
         <p:blipFill>
           <a:blip r:embed="rId2">
@@ -6451,8 +7191,8 @@
         </p:blipFill>
         <p:spPr bwMode="auto">
           <a:xfrm>
-            <a:off x="1828800" y="685800"/>
-            <a:ext cx="5486400" cy="5486400"/>
+            <a:off x="457200" y="1490472"/>
+            <a:ext cx="3657600" cy="3657600"/>
           </a:xfrm>
           <a:prstGeom prst="rect">
             <a:avLst/>
@@ -6472,7 +7212,7 @@
     </p:spTree>
     <p:extLst>
       <p:ext uri="{BB962C8B-B14F-4D97-AF65-F5344CB8AC3E}">
-        <p14:creationId xmlns:p14="http://schemas.microsoft.com/office/powerpoint/2010/main" val="4276356577"/>
+        <p14:creationId xmlns:p14="http://schemas.microsoft.com/office/powerpoint/2010/main" val="1681876605"/>
       </p:ext>
     </p:extLst>
   </p:cSld>
@@ -6509,13 +7249,91 @@
           <a:chExt cx="0" cy="0"/>
         </a:xfrm>
       </p:grpSpPr>
+      <p:sp>
+        <p:nvSpPr>
+          <p:cNvPr id="11" name="Title 10"/>
+          <p:cNvSpPr>
+            <a:spLocks noGrp="1"/>
+          </p:cNvSpPr>
+          <p:nvPr>
+            <p:ph type="title"/>
+          </p:nvPr>
+        </p:nvSpPr>
+        <p:spPr/>
+        <p:txBody>
+          <a:bodyPr/>
+          <a:lstStyle/>
+          <a:p>
+            <a:r>
+              <a:rPr lang="en-US" dirty="0" smtClean="0"/>
+              <a:t>DRY: Don’t Repeat Yourself</a:t>
+            </a:r>
+            <a:endParaRPr lang="en-US" dirty="0"/>
+          </a:p>
+        </p:txBody>
+      </p:sp>
+      <p:sp>
+        <p:nvSpPr>
+          <p:cNvPr id="10" name="Text Placeholder 9"/>
+          <p:cNvSpPr>
+            <a:spLocks noGrp="1"/>
+          </p:cNvSpPr>
+          <p:nvPr>
+            <p:ph sz="half" idx="2"/>
+          </p:nvPr>
+        </p:nvSpPr>
+        <p:spPr>
+          <a:xfrm>
+            <a:off x="4495800" y="1478280"/>
+            <a:ext cx="4191000" cy="3853180"/>
+          </a:xfrm>
+        </p:spPr>
+        <p:txBody>
+          <a:bodyPr>
+            <a:normAutofit/>
+          </a:bodyPr>
+          <a:lstStyle/>
+          <a:p>
+            <a:pPr marL="118872" indent="0">
+              <a:buNone/>
+            </a:pPr>
+            <a:r>
+              <a:rPr lang="en-US" i="1" dirty="0" smtClean="0"/>
+              <a:t>The Don’t Repeat Yourself Principle is ‘There can be only one!’ (expression of any rule or functionality that could conceivably change)</a:t>
+            </a:r>
+            <a:endParaRPr lang="en-US" i="1" dirty="0"/>
+          </a:p>
+          <a:p>
+            <a:pPr marL="118872" indent="0" algn="r">
+              <a:buNone/>
+            </a:pPr>
+            <a:endParaRPr lang="en-US" dirty="0"/>
+          </a:p>
+          <a:p>
+            <a:pPr marL="118872" indent="0" algn="r">
+              <a:buNone/>
+            </a:pPr>
+            <a:r>
+              <a:rPr lang="en-US" dirty="0"/>
+              <a:t>― </a:t>
+            </a:r>
+            <a:r>
+              <a:rPr lang="en-US" dirty="0" smtClean="0"/>
+              <a:t>Jeremy Miller</a:t>
+            </a:r>
+            <a:endParaRPr lang="en-US" dirty="0"/>
+          </a:p>
+        </p:txBody>
+      </p:sp>
       <p:pic>
         <p:nvPicPr>
-          <p:cNvPr id="4106" name="Picture 10" descr="http://deviq.com/Media/Default/Article/DontRepeatYourself.jpg"/>
+          <p:cNvPr id="7" name="Picture 10" descr="http://deviq.com/Media/Default/Article/DontRepeatYourself.jpg"/>
           <p:cNvPicPr>
-            <a:picLocks noChangeAspect="1" noChangeArrowheads="1"/>
+            <a:picLocks noGrp="1" noChangeAspect="1" noChangeArrowheads="1"/>
           </p:cNvPicPr>
-          <p:nvPr/>
+          <p:nvPr>
+            <p:ph sz="half" idx="1"/>
+          </p:nvPr>
         </p:nvPicPr>
         <p:blipFill>
           <a:blip r:embed="rId2">
@@ -6532,8 +7350,8 @@
         </p:blipFill>
         <p:spPr bwMode="auto">
           <a:xfrm>
-            <a:off x="1828800" y="685800"/>
-            <a:ext cx="5486400" cy="5486400"/>
+            <a:off x="457200" y="1490472"/>
+            <a:ext cx="3657600" cy="3657600"/>
           </a:xfrm>
           <a:prstGeom prst="rect">
             <a:avLst/>
@@ -6553,7 +7371,7 @@
     </p:spTree>
     <p:extLst>
       <p:ext uri="{BB962C8B-B14F-4D97-AF65-F5344CB8AC3E}">
-        <p14:creationId xmlns:p14="http://schemas.microsoft.com/office/powerpoint/2010/main" val="4276356577"/>
+        <p14:creationId xmlns:p14="http://schemas.microsoft.com/office/powerpoint/2010/main" val="4253056929"/>
       </p:ext>
     </p:extLst>
   </p:cSld>
@@ -6590,13 +7408,95 @@
           <a:chExt cx="0" cy="0"/>
         </a:xfrm>
       </p:grpSpPr>
+      <p:sp>
+        <p:nvSpPr>
+          <p:cNvPr id="11" name="Title 10"/>
+          <p:cNvSpPr>
+            <a:spLocks noGrp="1"/>
+          </p:cNvSpPr>
+          <p:nvPr>
+            <p:ph type="title"/>
+          </p:nvPr>
+        </p:nvSpPr>
+        <p:spPr/>
+        <p:txBody>
+          <a:bodyPr/>
+          <a:lstStyle/>
+          <a:p>
+            <a:r>
+              <a:rPr lang="en-US" dirty="0" smtClean="0"/>
+              <a:t>Whole Team Activity</a:t>
+            </a:r>
+            <a:endParaRPr lang="en-US" dirty="0"/>
+          </a:p>
+        </p:txBody>
+      </p:sp>
+      <p:sp>
+        <p:nvSpPr>
+          <p:cNvPr id="10" name="Text Placeholder 9"/>
+          <p:cNvSpPr>
+            <a:spLocks noGrp="1"/>
+          </p:cNvSpPr>
+          <p:nvPr>
+            <p:ph sz="half" idx="2"/>
+          </p:nvPr>
+        </p:nvSpPr>
+        <p:spPr>
+          <a:xfrm>
+            <a:off x="4495800" y="1478280"/>
+            <a:ext cx="4191000" cy="3853180"/>
+          </a:xfrm>
+        </p:spPr>
+        <p:txBody>
+          <a:bodyPr>
+            <a:normAutofit/>
+          </a:bodyPr>
+          <a:lstStyle/>
+          <a:p>
+            <a:pPr marL="118872" indent="0">
+              <a:buNone/>
+            </a:pPr>
+            <a:r>
+              <a:rPr lang="en-US" i="1" dirty="0" smtClean="0"/>
+              <a:t>Customers don’t want software; they want their problems solved. Complete solutions are built by complete teams.</a:t>
+            </a:r>
+            <a:endParaRPr lang="en-US" i="1" dirty="0"/>
+          </a:p>
+          <a:p>
+            <a:pPr marL="118872" indent="0" algn="r">
+              <a:buNone/>
+            </a:pPr>
+            <a:endParaRPr lang="en-US" dirty="0"/>
+          </a:p>
+          <a:p>
+            <a:pPr marL="118872" indent="0" algn="r">
+              <a:buNone/>
+            </a:pPr>
+            <a:r>
+              <a:rPr lang="en-US" dirty="0"/>
+              <a:t>― </a:t>
+            </a:r>
+            <a:r>
+              <a:rPr lang="en-US" dirty="0" smtClean="0"/>
+              <a:t>Mary &amp; Tom </a:t>
+            </a:r>
+            <a:r>
+              <a:rPr lang="en-US" dirty="0" err="1" smtClean="0"/>
+              <a:t>Poppendieck</a:t>
+            </a:r>
+            <a:endParaRPr lang="en-US" dirty="0"/>
+          </a:p>
+        </p:txBody>
+      </p:sp>
       <p:pic>
         <p:nvPicPr>
-          <p:cNvPr id="5125" name="Picture 5" descr="Whole Team Activity"/>
+          <p:cNvPr id="6" name="Content Placeholder 5" descr="Whole Team Activity"/>
           <p:cNvPicPr>
-            <a:picLocks noChangeAspect="1" noChangeArrowheads="1"/>
+            <a:picLocks noGrp="1" noChangeAspect="1" noChangeArrowheads="1"/>
           </p:cNvPicPr>
-          <p:nvPr/>
+          <p:nvPr>
+            <p:ph sz="half" idx="1"/>
+          </p:nvPr>
         </p:nvPicPr>
         <p:blipFill>
           <a:blip r:embed="rId2">
@@ -6613,8 +7513,8 @@
         </p:blipFill>
         <p:spPr bwMode="auto">
           <a:xfrm>
-            <a:off x="1828800" y="685800"/>
-            <a:ext cx="5486400" cy="5486400"/>
+            <a:off x="457200" y="1490472"/>
+            <a:ext cx="3657600" cy="3657600"/>
           </a:xfrm>
           <a:prstGeom prst="rect">
             <a:avLst/>
@@ -6634,7 +7534,7 @@
     </p:spTree>
     <p:extLst>
       <p:ext uri="{BB962C8B-B14F-4D97-AF65-F5344CB8AC3E}">
-        <p14:creationId xmlns:p14="http://schemas.microsoft.com/office/powerpoint/2010/main" val="4276356577"/>
+        <p14:creationId xmlns:p14="http://schemas.microsoft.com/office/powerpoint/2010/main" val="1524869863"/>
       </p:ext>
     </p:extLst>
   </p:cSld>
@@ -6671,13 +7571,98 @@
           <a:chExt cx="0" cy="0"/>
         </a:xfrm>
       </p:grpSpPr>
+      <p:sp>
+        <p:nvSpPr>
+          <p:cNvPr id="11" name="Title 10"/>
+          <p:cNvSpPr>
+            <a:spLocks noGrp="1"/>
+          </p:cNvSpPr>
+          <p:nvPr>
+            <p:ph type="title"/>
+          </p:nvPr>
+        </p:nvSpPr>
+        <p:spPr/>
+        <p:txBody>
+          <a:bodyPr/>
+          <a:lstStyle/>
+          <a:p>
+            <a:r>
+              <a:rPr lang="en-US" dirty="0" smtClean="0"/>
+              <a:t>Hollywood Principle</a:t>
+            </a:r>
+            <a:endParaRPr lang="en-US" dirty="0"/>
+          </a:p>
+        </p:txBody>
+      </p:sp>
+      <p:sp>
+        <p:nvSpPr>
+          <p:cNvPr id="10" name="Text Placeholder 9"/>
+          <p:cNvSpPr>
+            <a:spLocks noGrp="1"/>
+          </p:cNvSpPr>
+          <p:nvPr>
+            <p:ph sz="half" idx="2"/>
+          </p:nvPr>
+        </p:nvSpPr>
+        <p:spPr>
+          <a:xfrm>
+            <a:off x="4495800" y="1478280"/>
+            <a:ext cx="4191000" cy="3853180"/>
+          </a:xfrm>
+        </p:spPr>
+        <p:txBody>
+          <a:bodyPr>
+            <a:normAutofit fontScale="92500"/>
+          </a:bodyPr>
+          <a:lstStyle/>
+          <a:p>
+            <a:pPr marL="118872" indent="0">
+              <a:buNone/>
+            </a:pPr>
+            <a:r>
+              <a:rPr lang="en-US" i="1" dirty="0" smtClean="0"/>
+              <a:t>We allow low-level components to hook themselves into a system, but the high-level components determine when they are needed, and how.</a:t>
+            </a:r>
+            <a:endParaRPr lang="en-US" i="1" dirty="0"/>
+          </a:p>
+          <a:p>
+            <a:pPr marL="118872" indent="0" algn="r">
+              <a:buNone/>
+            </a:pPr>
+            <a:endParaRPr lang="en-US" dirty="0"/>
+          </a:p>
+          <a:p>
+            <a:pPr marL="118872" indent="0" algn="r">
+              <a:buNone/>
+            </a:pPr>
+            <a:r>
+              <a:rPr lang="en-US" dirty="0"/>
+              <a:t>― </a:t>
+            </a:r>
+            <a:r>
+              <a:rPr lang="en-US" dirty="0" smtClean="0"/>
+              <a:t>Eric Freeman</a:t>
+            </a:r>
+            <a:br>
+              <a:rPr lang="en-US" dirty="0" smtClean="0"/>
+            </a:br>
+            <a:r>
+              <a:rPr lang="en-US" dirty="0" smtClean="0"/>
+              <a:t>Head First Design Patterns</a:t>
+            </a:r>
+            <a:endParaRPr lang="en-US" dirty="0"/>
+          </a:p>
+        </p:txBody>
+      </p:sp>
       <p:pic>
         <p:nvPicPr>
-          <p:cNvPr id="6149" name="Picture 5" descr="http://deviq.com/Media/Default/Article/Dont-Call-Us-Well-Call-You-Jun-2013.png"/>
+          <p:cNvPr id="7" name="Picture 5" descr="http://deviq.com/Media/Default/Article/Dont-Call-Us-Well-Call-You-Jun-2013.png"/>
           <p:cNvPicPr>
-            <a:picLocks noChangeAspect="1" noChangeArrowheads="1"/>
+            <a:picLocks noGrp="1" noChangeAspect="1" noChangeArrowheads="1"/>
           </p:cNvPicPr>
-          <p:nvPr/>
+          <p:nvPr>
+            <p:ph sz="half" idx="1"/>
+          </p:nvPr>
         </p:nvPicPr>
         <p:blipFill>
           <a:blip r:embed="rId2">
@@ -6694,8 +7679,8 @@
         </p:blipFill>
         <p:spPr bwMode="auto">
           <a:xfrm>
-            <a:off x="1828800" y="685800"/>
-            <a:ext cx="5486400" cy="5486400"/>
+            <a:off x="457200" y="1490472"/>
+            <a:ext cx="3657600" cy="3657600"/>
           </a:xfrm>
           <a:prstGeom prst="rect">
             <a:avLst/>
@@ -6715,7 +7700,7 @@
     </p:spTree>
     <p:extLst>
       <p:ext uri="{BB962C8B-B14F-4D97-AF65-F5344CB8AC3E}">
-        <p14:creationId xmlns:p14="http://schemas.microsoft.com/office/powerpoint/2010/main" val="4276356577"/>
+        <p14:creationId xmlns:p14="http://schemas.microsoft.com/office/powerpoint/2010/main" val="2715329645"/>
       </p:ext>
     </p:extLst>
   </p:cSld>

</xml_diff>